<commit_message>
Put the changes made
</commit_message>
<xml_diff>
--- a/Presentation/1-Proposal seminar.pptx
+++ b/Presentation/1-Proposal seminar.pptx
@@ -2,7 +2,7 @@
 <file path=ppt/presentation.xml><?xml version="1.0" encoding="utf-8"?>
 <p:presentation xmlns:a="http://schemas.openxmlformats.org/drawingml/2006/main" xmlns:r="http://schemas.openxmlformats.org/officeDocument/2006/relationships" xmlns:p="http://schemas.openxmlformats.org/presentationml/2006/main" saveSubsetFonts="1" autoCompressPictures="0">
   <p:sldMasterIdLst>
-    <p:sldMasterId id="2147483648" r:id="rId1"/>
+    <p:sldMasterId id="2147483696" r:id="rId1"/>
   </p:sldMasterIdLst>
   <p:sldIdLst>
     <p:sldId id="256" r:id="rId2"/>
@@ -361,9 +361,9 @@
           </a:lstStyle>
           <a:p>
             <a:fld id="{B61BEF0D-F0BB-DE4B-95CE-6DB70DBA9567}" type="datetimeFigureOut">
-              <a:rPr lang="en-US" dirty="0"/>
+              <a:rPr lang="en-US" smtClean="0"/>
               <a:pPr/>
-              <a:t>2/2/17</a:t>
+              <a:t>2/6/2017</a:t>
             </a:fld>
             <a:endParaRPr lang="en-US" dirty="0"/>
           </a:p>
@@ -436,7 +436,7 @@
           </a:lstStyle>
           <a:p>
             <a:fld id="{D57F1E4F-1CFF-5643-939E-217C01CDF565}" type="slidenum">
-              <a:rPr lang="en-US" dirty="0"/>
+              <a:rPr lang="en-US" smtClean="0"/>
               <a:pPr/>
               <a:t>‹#›</a:t>
             </a:fld>
@@ -445,6 +445,11 @@
         </p:txBody>
       </p:sp>
     </p:spTree>
+    <p:extLst>
+      <p:ext uri="{BB962C8B-B14F-4D97-AF65-F5344CB8AC3E}">
+        <p14:creationId xmlns:p14="http://schemas.microsoft.com/office/powerpoint/2010/main" val="1955005661"/>
+      </p:ext>
+    </p:extLst>
   </p:cSld>
   <p:clrMapOvr>
     <a:masterClrMapping/>
@@ -570,7 +575,7 @@
             <a:pPr lvl="0"/>
             <a:r>
               <a:rPr lang="en-US"/>
-              <a:t>Click to edit Master text styles</a:t>
+              <a:t>Edit Master text styles</a:t>
             </a:r>
           </a:p>
           <a:p>
@@ -620,9 +625,9 @@
           <a:lstStyle/>
           <a:p>
             <a:fld id="{B61BEF0D-F0BB-DE4B-95CE-6DB70DBA9567}" type="datetimeFigureOut">
-              <a:rPr lang="en-US" dirty="0"/>
+              <a:rPr lang="en-US" smtClean="0"/>
               <a:pPr/>
-              <a:t>2/2/17</a:t>
+              <a:t>2/6/2017</a:t>
             </a:fld>
             <a:endParaRPr lang="en-US" dirty="0"/>
           </a:p>
@@ -663,7 +668,7 @@
           <a:lstStyle/>
           <a:p>
             <a:fld id="{D57F1E4F-1CFF-5643-939E-217C01CDF565}" type="slidenum">
-              <a:rPr lang="en-US" dirty="0"/>
+              <a:rPr lang="en-US" smtClean="0"/>
               <a:pPr/>
               <a:t>‹#›</a:t>
             </a:fld>
@@ -672,6 +677,11 @@
         </p:txBody>
       </p:sp>
     </p:spTree>
+    <p:extLst>
+      <p:ext uri="{BB962C8B-B14F-4D97-AF65-F5344CB8AC3E}">
+        <p14:creationId xmlns:p14="http://schemas.microsoft.com/office/powerpoint/2010/main" val="3722002179"/>
+      </p:ext>
+    </p:extLst>
   </p:cSld>
   <p:clrMapOvr>
     <a:masterClrMapping/>
@@ -786,7 +796,7 @@
             <a:pPr lvl="0"/>
             <a:r>
               <a:rPr lang="en-US"/>
-              <a:t>Click to edit Master text styles</a:t>
+              <a:t>Edit Master text styles</a:t>
             </a:r>
           </a:p>
           <a:p>
@@ -852,9 +862,9 @@
           </a:lstStyle>
           <a:p>
             <a:fld id="{B61BEF0D-F0BB-DE4B-95CE-6DB70DBA9567}" type="datetimeFigureOut">
-              <a:rPr lang="en-US" dirty="0"/>
+              <a:rPr lang="en-US" smtClean="0"/>
               <a:pPr/>
-              <a:t>2/2/17</a:t>
+              <a:t>2/6/2017</a:t>
             </a:fld>
             <a:endParaRPr lang="en-US" dirty="0"/>
           </a:p>
@@ -916,7 +926,7 @@
           </a:lstStyle>
           <a:p>
             <a:fld id="{D57F1E4F-1CFF-5643-939E-217C01CDF565}" type="slidenum">
-              <a:rPr lang="en-US" dirty="0"/>
+              <a:rPr lang="en-US" smtClean="0"/>
               <a:pPr/>
               <a:t>‹#›</a:t>
             </a:fld>
@@ -925,6 +935,11 @@
         </p:txBody>
       </p:sp>
     </p:spTree>
+    <p:extLst>
+      <p:ext uri="{BB962C8B-B14F-4D97-AF65-F5344CB8AC3E}">
+        <p14:creationId xmlns:p14="http://schemas.microsoft.com/office/powerpoint/2010/main" val="2079709952"/>
+      </p:ext>
+    </p:extLst>
   </p:cSld>
   <p:clrMapOvr>
     <a:masterClrMapping/>
@@ -1039,7 +1054,7 @@
             <a:pPr lvl="0"/>
             <a:r>
               <a:rPr lang="en-US"/>
-              <a:t>Click to edit Master text styles</a:t>
+              <a:t>Edit Master text styles</a:t>
             </a:r>
           </a:p>
           <a:p>
@@ -1089,9 +1104,9 @@
           <a:lstStyle/>
           <a:p>
             <a:fld id="{B61BEF0D-F0BB-DE4B-95CE-6DB70DBA9567}" type="datetimeFigureOut">
-              <a:rPr lang="en-US" dirty="0"/>
+              <a:rPr lang="en-US" smtClean="0"/>
               <a:pPr/>
-              <a:t>2/2/17</a:t>
+              <a:t>2/6/2017</a:t>
             </a:fld>
             <a:endParaRPr lang="en-US" dirty="0"/>
           </a:p>
@@ -1137,7 +1152,7 @@
           <a:lstStyle/>
           <a:p>
             <a:fld id="{D57F1E4F-1CFF-5643-939E-217C01CDF565}" type="slidenum">
-              <a:rPr lang="en-US" dirty="0"/>
+              <a:rPr lang="en-US" smtClean="0"/>
               <a:pPr/>
               <a:t>‹#›</a:t>
             </a:fld>
@@ -1146,6 +1161,11 @@
         </p:txBody>
       </p:sp>
     </p:spTree>
+    <p:extLst>
+      <p:ext uri="{BB962C8B-B14F-4D97-AF65-F5344CB8AC3E}">
+        <p14:creationId xmlns:p14="http://schemas.microsoft.com/office/powerpoint/2010/main" val="1156571372"/>
+      </p:ext>
+    </p:extLst>
   </p:cSld>
   <p:clrMapOvr>
     <a:masterClrMapping/>
@@ -1361,7 +1381,7 @@
             <a:pPr lvl="0"/>
             <a:r>
               <a:rPr lang="en-US"/>
-              <a:t>Click to edit Master text styles</a:t>
+              <a:t>Edit Master text styles</a:t>
             </a:r>
           </a:p>
         </p:txBody>
@@ -1393,9 +1413,9 @@
           </a:lstStyle>
           <a:p>
             <a:fld id="{B61BEF0D-F0BB-DE4B-95CE-6DB70DBA9567}" type="datetimeFigureOut">
-              <a:rPr lang="en-US" dirty="0"/>
+              <a:rPr lang="en-US" smtClean="0"/>
               <a:pPr/>
-              <a:t>2/2/17</a:t>
+              <a:t>2/6/2017</a:t>
             </a:fld>
             <a:endParaRPr lang="en-US" dirty="0"/>
           </a:p>
@@ -1458,7 +1478,7 @@
           </a:lstStyle>
           <a:p>
             <a:fld id="{D57F1E4F-1CFF-5643-939E-217C01CDF565}" type="slidenum">
-              <a:rPr lang="en-US" dirty="0"/>
+              <a:rPr lang="en-US" smtClean="0"/>
               <a:pPr/>
               <a:t>‹#›</a:t>
             </a:fld>
@@ -1467,6 +1487,11 @@
         </p:txBody>
       </p:sp>
     </p:spTree>
+    <p:extLst>
+      <p:ext uri="{BB962C8B-B14F-4D97-AF65-F5344CB8AC3E}">
+        <p14:creationId xmlns:p14="http://schemas.microsoft.com/office/powerpoint/2010/main" val="2128715167"/>
+      </p:ext>
+    </p:extLst>
   </p:cSld>
   <p:clrMapOvr>
     <a:masterClrMapping/>
@@ -1583,7 +1608,7 @@
             <a:pPr lvl="0"/>
             <a:r>
               <a:rPr lang="en-US"/>
-              <a:t>Click to edit Master text styles</a:t>
+              <a:t>Edit Master text styles</a:t>
             </a:r>
           </a:p>
           <a:p>
@@ -1642,7 +1667,7 @@
             <a:pPr lvl="0"/>
             <a:r>
               <a:rPr lang="en-US"/>
-              <a:t>Click to edit Master text styles</a:t>
+              <a:t>Edit Master text styles</a:t>
             </a:r>
           </a:p>
           <a:p>
@@ -1692,9 +1717,9 @@
           <a:lstStyle/>
           <a:p>
             <a:fld id="{B61BEF0D-F0BB-DE4B-95CE-6DB70DBA9567}" type="datetimeFigureOut">
-              <a:rPr lang="en-US" dirty="0"/>
+              <a:rPr lang="en-US" smtClean="0"/>
               <a:pPr/>
-              <a:t>2/2/17</a:t>
+              <a:t>2/6/2017</a:t>
             </a:fld>
             <a:endParaRPr lang="en-US" dirty="0"/>
           </a:p>
@@ -1735,7 +1760,7 @@
           <a:lstStyle/>
           <a:p>
             <a:fld id="{D57F1E4F-1CFF-5643-939E-217C01CDF565}" type="slidenum">
-              <a:rPr lang="en-US" dirty="0"/>
+              <a:rPr lang="en-US" smtClean="0"/>
               <a:pPr/>
               <a:t>‹#›</a:t>
             </a:fld>
@@ -1744,6 +1769,11 @@
         </p:txBody>
       </p:sp>
     </p:spTree>
+    <p:extLst>
+      <p:ext uri="{BB962C8B-B14F-4D97-AF65-F5344CB8AC3E}">
+        <p14:creationId xmlns:p14="http://schemas.microsoft.com/office/powerpoint/2010/main" val="97269402"/>
+      </p:ext>
+    </p:extLst>
   </p:cSld>
   <p:clrMapOvr>
     <a:masterClrMapping/>
@@ -1901,7 +1931,7 @@
             <a:pPr lvl="0"/>
             <a:r>
               <a:rPr lang="en-US"/>
-              <a:t>Click to edit Master text styles</a:t>
+              <a:t>Edit Master text styles</a:t>
             </a:r>
           </a:p>
         </p:txBody>
@@ -1931,7 +1961,7 @@
             <a:pPr lvl="0"/>
             <a:r>
               <a:rPr lang="en-US"/>
-              <a:t>Click to edit Master text styles</a:t>
+              <a:t>Edit Master text styles</a:t>
             </a:r>
           </a:p>
           <a:p>
@@ -2031,7 +2061,7 @@
             <a:pPr lvl="0"/>
             <a:r>
               <a:rPr lang="en-US"/>
-              <a:t>Click to edit Master text styles</a:t>
+              <a:t>Edit Master text styles</a:t>
             </a:r>
           </a:p>
         </p:txBody>
@@ -2061,7 +2091,7 @@
             <a:pPr lvl="0"/>
             <a:r>
               <a:rPr lang="en-US"/>
-              <a:t>Click to edit Master text styles</a:t>
+              <a:t>Edit Master text styles</a:t>
             </a:r>
           </a:p>
           <a:p>
@@ -2111,9 +2141,9 @@
           <a:lstStyle/>
           <a:p>
             <a:fld id="{B61BEF0D-F0BB-DE4B-95CE-6DB70DBA9567}" type="datetimeFigureOut">
-              <a:rPr lang="en-US" dirty="0"/>
+              <a:rPr lang="en-US" smtClean="0"/>
               <a:pPr/>
-              <a:t>2/2/17</a:t>
+              <a:t>2/6/2017</a:t>
             </a:fld>
             <a:endParaRPr lang="en-US" dirty="0"/>
           </a:p>
@@ -2154,7 +2184,7 @@
           <a:lstStyle/>
           <a:p>
             <a:fld id="{D57F1E4F-1CFF-5643-939E-217C01CDF565}" type="slidenum">
-              <a:rPr lang="en-US" dirty="0"/>
+              <a:rPr lang="en-US" smtClean="0"/>
               <a:pPr/>
               <a:t>‹#›</a:t>
             </a:fld>
@@ -2163,6 +2193,11 @@
         </p:txBody>
       </p:sp>
     </p:spTree>
+    <p:extLst>
+      <p:ext uri="{BB962C8B-B14F-4D97-AF65-F5344CB8AC3E}">
+        <p14:creationId xmlns:p14="http://schemas.microsoft.com/office/powerpoint/2010/main" val="2879127656"/>
+      </p:ext>
+    </p:extLst>
   </p:cSld>
   <p:clrMapOvr>
     <a:masterClrMapping/>
@@ -2189,6 +2224,73 @@
       </p:grpSpPr>
       <p:sp>
         <p:nvSpPr>
+          <p:cNvPr id="3" name="Date Placeholder 2"/>
+          <p:cNvSpPr>
+            <a:spLocks noGrp="1"/>
+          </p:cNvSpPr>
+          <p:nvPr>
+            <p:ph type="dt" sz="half" idx="10"/>
+          </p:nvPr>
+        </p:nvSpPr>
+        <p:spPr/>
+        <p:txBody>
+          <a:bodyPr/>
+          <a:lstStyle/>
+          <a:p>
+            <a:fld id="{B61BEF0D-F0BB-DE4B-95CE-6DB70DBA9567}" type="datetimeFigureOut">
+              <a:rPr lang="en-US" smtClean="0"/>
+              <a:pPr/>
+              <a:t>2/6/2017</a:t>
+            </a:fld>
+            <a:endParaRPr lang="en-US" dirty="0"/>
+          </a:p>
+        </p:txBody>
+      </p:sp>
+      <p:sp>
+        <p:nvSpPr>
+          <p:cNvPr id="4" name="Footer Placeholder 3"/>
+          <p:cNvSpPr>
+            <a:spLocks noGrp="1"/>
+          </p:cNvSpPr>
+          <p:nvPr>
+            <p:ph type="ftr" sz="quarter" idx="11"/>
+          </p:nvPr>
+        </p:nvSpPr>
+        <p:spPr/>
+        <p:txBody>
+          <a:bodyPr/>
+          <a:lstStyle/>
+          <a:p>
+            <a:endParaRPr lang="en-US" dirty="0"/>
+          </a:p>
+        </p:txBody>
+      </p:sp>
+      <p:sp>
+        <p:nvSpPr>
+          <p:cNvPr id="5" name="Slide Number Placeholder 4"/>
+          <p:cNvSpPr>
+            <a:spLocks noGrp="1"/>
+          </p:cNvSpPr>
+          <p:nvPr>
+            <p:ph type="sldNum" sz="quarter" idx="12"/>
+          </p:nvPr>
+        </p:nvSpPr>
+        <p:spPr/>
+        <p:txBody>
+          <a:bodyPr/>
+          <a:lstStyle/>
+          <a:p>
+            <a:fld id="{D57F1E4F-1CFF-5643-939E-217C01CDF565}" type="slidenum">
+              <a:rPr lang="en-US" smtClean="0"/>
+              <a:pPr/>
+              <a:t>‹#›</a:t>
+            </a:fld>
+            <a:endParaRPr lang="en-US" dirty="0"/>
+          </a:p>
+        </p:txBody>
+      </p:sp>
+      <p:sp>
+        <p:nvSpPr>
           <p:cNvPr id="7" name="Rectangle 6"/>
           <p:cNvSpPr>
             <a:spLocks noChangeAspect="1"/>
@@ -2254,74 +2356,12 @@
           </a:p>
         </p:txBody>
       </p:sp>
-      <p:sp>
-        <p:nvSpPr>
-          <p:cNvPr id="3" name="Date Placeholder 2"/>
-          <p:cNvSpPr>
-            <a:spLocks noGrp="1"/>
-          </p:cNvSpPr>
-          <p:nvPr>
-            <p:ph type="dt" sz="half" idx="10"/>
-          </p:nvPr>
-        </p:nvSpPr>
-        <p:spPr/>
-        <p:txBody>
-          <a:bodyPr/>
-          <a:lstStyle/>
-          <a:p>
-            <a:fld id="{B61BEF0D-F0BB-DE4B-95CE-6DB70DBA9567}" type="datetimeFigureOut">
-              <a:rPr lang="en-US" dirty="0"/>
-              <a:pPr/>
-              <a:t>2/2/17</a:t>
-            </a:fld>
-            <a:endParaRPr lang="en-US" dirty="0"/>
-          </a:p>
-        </p:txBody>
-      </p:sp>
-      <p:sp>
-        <p:nvSpPr>
-          <p:cNvPr id="4" name="Footer Placeholder 3"/>
-          <p:cNvSpPr>
-            <a:spLocks noGrp="1"/>
-          </p:cNvSpPr>
-          <p:nvPr>
-            <p:ph type="ftr" sz="quarter" idx="11"/>
-          </p:nvPr>
-        </p:nvSpPr>
-        <p:spPr/>
-        <p:txBody>
-          <a:bodyPr/>
-          <a:lstStyle/>
-          <a:p>
-            <a:endParaRPr lang="en-US" dirty="0"/>
-          </a:p>
-        </p:txBody>
-      </p:sp>
-      <p:sp>
-        <p:nvSpPr>
-          <p:cNvPr id="5" name="Slide Number Placeholder 4"/>
-          <p:cNvSpPr>
-            <a:spLocks noGrp="1"/>
-          </p:cNvSpPr>
-          <p:nvPr>
-            <p:ph type="sldNum" sz="quarter" idx="12"/>
-          </p:nvPr>
-        </p:nvSpPr>
-        <p:spPr/>
-        <p:txBody>
-          <a:bodyPr/>
-          <a:lstStyle/>
-          <a:p>
-            <a:fld id="{D57F1E4F-1CFF-5643-939E-217C01CDF565}" type="slidenum">
-              <a:rPr lang="en-US" dirty="0"/>
-              <a:pPr/>
-              <a:t>‹#›</a:t>
-            </a:fld>
-            <a:endParaRPr lang="en-US" dirty="0"/>
-          </a:p>
-        </p:txBody>
-      </p:sp>
     </p:spTree>
+    <p:extLst>
+      <p:ext uri="{BB962C8B-B14F-4D97-AF65-F5344CB8AC3E}">
+        <p14:creationId xmlns:p14="http://schemas.microsoft.com/office/powerpoint/2010/main" val="1210715451"/>
+      </p:ext>
+    </p:extLst>
   </p:cSld>
   <p:clrMapOvr>
     <a:masterClrMapping/>
@@ -2362,9 +2402,9 @@
           <a:lstStyle/>
           <a:p>
             <a:fld id="{B61BEF0D-F0BB-DE4B-95CE-6DB70DBA9567}" type="datetimeFigureOut">
-              <a:rPr lang="en-US" dirty="0"/>
+              <a:rPr lang="en-US" smtClean="0"/>
               <a:pPr/>
-              <a:t>2/2/17</a:t>
+              <a:t>2/6/2017</a:t>
             </a:fld>
             <a:endParaRPr lang="en-US" dirty="0"/>
           </a:p>
@@ -2405,7 +2445,7 @@
           <a:lstStyle/>
           <a:p>
             <a:fld id="{D57F1E4F-1CFF-5643-939E-217C01CDF565}" type="slidenum">
-              <a:rPr lang="en-US" dirty="0"/>
+              <a:rPr lang="en-US" smtClean="0"/>
               <a:pPr/>
               <a:t>‹#›</a:t>
             </a:fld>
@@ -2414,6 +2454,11 @@
         </p:txBody>
       </p:sp>
     </p:spTree>
+    <p:extLst>
+      <p:ext uri="{BB962C8B-B14F-4D97-AF65-F5344CB8AC3E}">
+        <p14:creationId xmlns:p14="http://schemas.microsoft.com/office/powerpoint/2010/main" val="2402172007"/>
+      </p:ext>
+    </p:extLst>
   </p:cSld>
   <p:clrMapOvr>
     <a:masterClrMapping/>
@@ -2605,7 +2650,7 @@
             <a:pPr lvl="0"/>
             <a:r>
               <a:rPr lang="en-US"/>
-              <a:t>Click to edit Master text styles</a:t>
+              <a:t>Edit Master text styles</a:t>
             </a:r>
           </a:p>
           <a:p>
@@ -2705,7 +2750,7 @@
             <a:pPr lvl="0"/>
             <a:r>
               <a:rPr lang="en-US"/>
-              <a:t>Click to edit Master text styles</a:t>
+              <a:t>Edit Master text styles</a:t>
             </a:r>
           </a:p>
         </p:txBody>
@@ -2737,9 +2782,9 @@
           </a:lstStyle>
           <a:p>
             <a:fld id="{B61BEF0D-F0BB-DE4B-95CE-6DB70DBA9567}" type="datetimeFigureOut">
-              <a:rPr lang="en-US" dirty="0"/>
+              <a:rPr lang="en-US" smtClean="0"/>
               <a:pPr/>
-              <a:t>2/2/17</a:t>
+              <a:t>2/6/2017</a:t>
             </a:fld>
             <a:endParaRPr lang="en-US" dirty="0"/>
           </a:p>
@@ -2802,7 +2847,7 @@
           </a:lstStyle>
           <a:p>
             <a:fld id="{D57F1E4F-1CFF-5643-939E-217C01CDF565}" type="slidenum">
-              <a:rPr lang="en-US" dirty="0"/>
+              <a:rPr lang="en-US" smtClean="0"/>
               <a:pPr/>
               <a:t>‹#›</a:t>
             </a:fld>
@@ -2811,6 +2856,11 @@
         </p:txBody>
       </p:sp>
     </p:spTree>
+    <p:extLst>
+      <p:ext uri="{BB962C8B-B14F-4D97-AF65-F5344CB8AC3E}">
+        <p14:creationId xmlns:p14="http://schemas.microsoft.com/office/powerpoint/2010/main" val="4136785275"/>
+      </p:ext>
+    </p:extLst>
   </p:cSld>
   <p:clrMapOvr>
     <a:masterClrMapping/>
@@ -2934,7 +2984,7 @@
           <a:p>
             <a:r>
               <a:rPr lang="en-US"/>
-              <a:t>Drag picture to placeholder or click icon to add</a:t>
+              <a:t>Click icon to add picture</a:t>
             </a:r>
             <a:endParaRPr lang="en-US" dirty="0"/>
           </a:p>
@@ -3002,7 +3052,7 @@
             <a:pPr lvl="0"/>
             <a:r>
               <a:rPr lang="en-US"/>
-              <a:t>Click to edit Master text styles</a:t>
+              <a:t>Edit Master text styles</a:t>
             </a:r>
           </a:p>
         </p:txBody>
@@ -3023,9 +3073,9 @@
           <a:lstStyle/>
           <a:p>
             <a:fld id="{B61BEF0D-F0BB-DE4B-95CE-6DB70DBA9567}" type="datetimeFigureOut">
-              <a:rPr lang="en-US" dirty="0"/>
+              <a:rPr lang="en-US" smtClean="0"/>
               <a:pPr/>
-              <a:t>2/2/17</a:t>
+              <a:t>2/6/2017</a:t>
             </a:fld>
             <a:endParaRPr lang="en-US" dirty="0"/>
           </a:p>
@@ -3066,7 +3116,7 @@
           <a:lstStyle/>
           <a:p>
             <a:fld id="{D57F1E4F-1CFF-5643-939E-217C01CDF565}" type="slidenum">
-              <a:rPr lang="en-US" dirty="0"/>
+              <a:rPr lang="en-US" smtClean="0"/>
               <a:pPr/>
               <a:t>‹#›</a:t>
             </a:fld>
@@ -3075,6 +3125,11 @@
         </p:txBody>
       </p:sp>
     </p:spTree>
+    <p:extLst>
+      <p:ext uri="{BB962C8B-B14F-4D97-AF65-F5344CB8AC3E}">
+        <p14:creationId xmlns:p14="http://schemas.microsoft.com/office/powerpoint/2010/main" val="3170725856"/>
+      </p:ext>
+    </p:extLst>
   </p:cSld>
   <p:clrMapOvr>
     <a:masterClrMapping/>
@@ -3165,7 +3220,7 @@
             <a:pPr lvl="0"/>
             <a:r>
               <a:rPr lang="en-US"/>
-              <a:t>Click to edit Master text styles</a:t>
+              <a:t>Edit Master text styles</a:t>
             </a:r>
           </a:p>
           <a:p>
@@ -3231,9 +3286,9 @@
           </a:lstStyle>
           <a:p>
             <a:fld id="{B61BEF0D-F0BB-DE4B-95CE-6DB70DBA9567}" type="datetimeFigureOut">
-              <a:rPr lang="en-US" dirty="0"/>
+              <a:rPr lang="en-US" smtClean="0"/>
               <a:pPr/>
-              <a:t>2/2/17</a:t>
+              <a:t>2/6/2017</a:t>
             </a:fld>
             <a:endParaRPr lang="en-US" dirty="0"/>
           </a:p>
@@ -3306,7 +3361,7 @@
           </a:lstStyle>
           <a:p>
             <a:fld id="{D57F1E4F-1CFF-5643-939E-217C01CDF565}" type="slidenum">
-              <a:rPr lang="en-US" dirty="0"/>
+              <a:rPr lang="en-US" smtClean="0"/>
               <a:pPr/>
               <a:t>‹#›</a:t>
             </a:fld>
@@ -3426,20 +3481,25 @@
         </p:style>
       </p:sp>
     </p:spTree>
+    <p:extLst>
+      <p:ext uri="{BB962C8B-B14F-4D97-AF65-F5344CB8AC3E}">
+        <p14:creationId xmlns:p14="http://schemas.microsoft.com/office/powerpoint/2010/main" val="1995180179"/>
+      </p:ext>
+    </p:extLst>
   </p:cSld>
   <p:clrMap bg1="lt1" tx1="dk1" bg2="lt2" tx2="dk2" accent1="accent1" accent2="accent2" accent3="accent3" accent4="accent4" accent5="accent5" accent6="accent6" hlink="hlink" folHlink="folHlink"/>
   <p:sldLayoutIdLst>
-    <p:sldLayoutId id="2147483649" r:id="rId1"/>
-    <p:sldLayoutId id="2147483650" r:id="rId2"/>
-    <p:sldLayoutId id="2147483651" r:id="rId3"/>
-    <p:sldLayoutId id="2147483652" r:id="rId4"/>
-    <p:sldLayoutId id="2147483653" r:id="rId5"/>
-    <p:sldLayoutId id="2147483654" r:id="rId6"/>
-    <p:sldLayoutId id="2147483655" r:id="rId7"/>
-    <p:sldLayoutId id="2147483656" r:id="rId8"/>
-    <p:sldLayoutId id="2147483657" r:id="rId9"/>
-    <p:sldLayoutId id="2147483658" r:id="rId10"/>
-    <p:sldLayoutId id="2147483659" r:id="rId11"/>
+    <p:sldLayoutId id="2147483697" r:id="rId1"/>
+    <p:sldLayoutId id="2147483698" r:id="rId2"/>
+    <p:sldLayoutId id="2147483699" r:id="rId3"/>
+    <p:sldLayoutId id="2147483700" r:id="rId4"/>
+    <p:sldLayoutId id="2147483701" r:id="rId5"/>
+    <p:sldLayoutId id="2147483702" r:id="rId6"/>
+    <p:sldLayoutId id="2147483703" r:id="rId7"/>
+    <p:sldLayoutId id="2147483704" r:id="rId8"/>
+    <p:sldLayoutId id="2147483705" r:id="rId9"/>
+    <p:sldLayoutId id="2147483706" r:id="rId10"/>
+    <p:sldLayoutId id="2147483707" r:id="rId11"/>
   </p:sldLayoutIdLst>
   <p:txStyles>
     <p:titleStyle>
@@ -3943,24 +4003,14 @@
           <a:p>
             <a:r>
               <a:rPr lang="en-US" dirty="0"/>
-              <a:t>To detect the degradation, improvement or steady state in CPU </a:t>
-            </a:r>
-            <a:r>
-              <a:rPr lang="en-US" dirty="0" smtClean="0"/>
-              <a:t>Utilization</a:t>
-            </a:r>
-            <a:endParaRPr lang="en-US" dirty="0"/>
-          </a:p>
-          <a:p>
-            <a:r>
-              <a:rPr lang="en-US" dirty="0" smtClean="0"/>
-              <a:t>To </a:t>
-            </a:r>
+              <a:t>To detect the degradation, improvement or steady state in CPU Utilization</a:t>
+            </a:r>
+          </a:p>
+          <a:p>
             <a:r>
               <a:rPr lang="en-US" dirty="0"/>
-              <a:t>detect whether there is some changes in test environment that impact on CPU Utilization </a:t>
-            </a:r>
-            <a:endParaRPr lang="en-US" dirty="0"/>
+              <a:t>To detect whether there is some changes in test environment that impact on CPU Utilization </a:t>
+            </a:r>
           </a:p>
           <a:p>
             <a:endParaRPr lang="en-US" dirty="0"/>
@@ -4035,10 +4085,9 @@
           <a:lstStyle/>
           <a:p>
             <a:r>
-              <a:rPr lang="en-US" dirty="0" smtClean="0"/>
+              <a:rPr lang="en-US" dirty="0"/>
               <a:t>Consists of 17 columns</a:t>
             </a:r>
-            <a:endParaRPr lang="en-US" dirty="0"/>
           </a:p>
         </p:txBody>
       </p:sp>
@@ -4110,18 +4159,17 @@
           <a:lstStyle/>
           <a:p>
             <a:r>
-              <a:rPr lang="en-US" dirty="0" smtClean="0"/>
+              <a:rPr lang="en-US" dirty="0"/>
               <a:t>Change point</a:t>
             </a:r>
             <a:r>
-              <a:rPr lang="sv-SE" dirty="0" smtClean="0"/>
+              <a:rPr lang="sv-SE" dirty="0"/>
               <a:t> </a:t>
             </a:r>
             <a:r>
-              <a:rPr lang="en-US" dirty="0" smtClean="0"/>
+              <a:rPr lang="en-US" dirty="0"/>
               <a:t>detection</a:t>
             </a:r>
-            <a:endParaRPr lang="en-US" dirty="0"/>
           </a:p>
         </p:txBody>
       </p:sp>
@@ -4280,7 +4328,7 @@
 <file path=ppt/theme/theme1.xml><?xml version="1.0" encoding="utf-8"?>
 <a:theme xmlns:a="http://schemas.openxmlformats.org/drawingml/2006/main" name="Dividend">
   <a:themeElements>
-    <a:clrScheme name="Blue Green">
+    <a:clrScheme name="Dividend">
       <a:dk1>
         <a:sysClr val="windowText" lastClr="000000"/>
       </a:dk1>
@@ -4288,34 +4336,34 @@
         <a:sysClr val="window" lastClr="FFFFFF"/>
       </a:lt1>
       <a:dk2>
-        <a:srgbClr val="373545"/>
+        <a:srgbClr val="3D3D3D"/>
       </a:dk2>
       <a:lt2>
-        <a:srgbClr val="CEDBE6"/>
+        <a:srgbClr val="EBEBEB"/>
       </a:lt2>
       <a:accent1>
-        <a:srgbClr val="3494BA"/>
+        <a:srgbClr val="1A3260"/>
       </a:accent1>
       <a:accent2>
-        <a:srgbClr val="58B6C0"/>
+        <a:srgbClr val="4590B8"/>
       </a:accent2>
       <a:accent3>
-        <a:srgbClr val="75BDA7"/>
+        <a:srgbClr val="45CBE8"/>
       </a:accent3>
       <a:accent4>
-        <a:srgbClr val="7A8C8E"/>
+        <a:srgbClr val="969FA7"/>
       </a:accent4>
       <a:accent5>
-        <a:srgbClr val="84ACB6"/>
+        <a:srgbClr val="A2C777"/>
       </a:accent5>
       <a:accent6>
-        <a:srgbClr val="2683C6"/>
+        <a:srgbClr val="42955F"/>
       </a:accent6>
       <a:hlink>
-        <a:srgbClr val="6B9F25"/>
+        <a:srgbClr val="828282"/>
       </a:hlink>
       <a:folHlink>
-        <a:srgbClr val="9F6715"/>
+        <a:srgbClr val="A5A5A5"/>
       </a:folHlink>
     </a:clrScheme>
     <a:fontScheme name="Dividend">
@@ -4540,7 +4588,7 @@
   <a:extraClrSchemeLst/>
   <a:extLst>
     <a:ext uri="{05A4C25C-085E-4340-85A3-A5531E510DB2}">
-      <thm15:themeFamily xmlns:thm15="http://schemas.microsoft.com/office/thememl/2012/main" name="Dividend" id="{9697A71B-4AB7-4A1A-BD5B-BB2D22835B57}" vid="{C21699FF-00E4-43C8-BBCC-D7E5536C3717}"/>
+      <thm15:themeFamily xmlns:thm15="http://schemas.microsoft.com/office/thememl/2012/main" name="Dividend" id="{9697A71B-4AB7-4A1A-BD5B-BB2D22835B57}" vid="{66F1C100-1D2B-4BEA-AD01-C4F230B3B965}"/>
     </a:ext>
   </a:extLst>
 </a:theme>

</xml_diff>

<commit_message>
hmm, pca and k-mean
</commit_message>
<xml_diff>
--- a/Presentation/1-Proposal seminar.pptx
+++ b/Presentation/1-Proposal seminar.pptx
@@ -22,7 +22,7 @@
     <p:sldId id="261" r:id="rId10"/>
   </p:sldIdLst>
   <p:sldSz cx="12192000" cy="6858000"/>
-  <p:notesSz cx="10233025" cy="7102475"/>
+  <p:notesSz cx="9874250" cy="6797675"/>
   <p:defaultTextStyle>
     <a:defPPr>
       <a:defRPr lang="en-US"/>
@@ -161,14 +161,14 @@
         <p:spPr>
           <a:xfrm>
             <a:off x="0" y="2"/>
-            <a:ext cx="4434311" cy="356359"/>
+            <a:ext cx="4278842" cy="341066"/>
           </a:xfrm>
           <a:prstGeom prst="rect">
             <a:avLst/>
           </a:prstGeom>
         </p:spPr>
         <p:txBody>
-          <a:bodyPr vert="horz" lIns="94652" tIns="47326" rIns="94652" bIns="47326" rtlCol="0"/>
+          <a:bodyPr vert="horz" lIns="90620" tIns="45310" rIns="90620" bIns="45310" rtlCol="0"/>
           <a:lstStyle>
             <a:lvl1pPr algn="l">
               <a:defRPr sz="1100"/>
@@ -191,15 +191,15 @@
         </p:nvSpPr>
         <p:spPr>
           <a:xfrm>
-            <a:off x="5796349" y="2"/>
-            <a:ext cx="4434311" cy="356359"/>
+            <a:off x="5593127" y="2"/>
+            <a:ext cx="4278842" cy="341066"/>
           </a:xfrm>
           <a:prstGeom prst="rect">
             <a:avLst/>
           </a:prstGeom>
         </p:spPr>
         <p:txBody>
-          <a:bodyPr vert="horz" lIns="94652" tIns="47326" rIns="94652" bIns="47326" rtlCol="0"/>
+          <a:bodyPr vert="horz" lIns="90620" tIns="45310" rIns="90620" bIns="45310" rtlCol="0"/>
           <a:lstStyle>
             <a:lvl1pPr algn="r">
               <a:defRPr sz="1100"/>
@@ -208,7 +208,7 @@
           <a:p>
             <a:fld id="{D4B88662-1E45-47A2-8E9E-64CF72FDD06B}" type="datetimeFigureOut">
               <a:rPr lang="en-US" smtClean="0"/>
-              <a:t>2/9/2017</a:t>
+              <a:t>2/10/2017</a:t>
             </a:fld>
             <a:endParaRPr lang="en-US"/>
           </a:p>
@@ -226,15 +226,15 @@
         </p:nvSpPr>
         <p:spPr>
           <a:xfrm>
-            <a:off x="0" y="6746119"/>
-            <a:ext cx="4434311" cy="356357"/>
+            <a:off x="0" y="6456612"/>
+            <a:ext cx="4278842" cy="341064"/>
           </a:xfrm>
           <a:prstGeom prst="rect">
             <a:avLst/>
           </a:prstGeom>
         </p:spPr>
         <p:txBody>
-          <a:bodyPr vert="horz" lIns="94652" tIns="47326" rIns="94652" bIns="47326" rtlCol="0" anchor="b"/>
+          <a:bodyPr vert="horz" lIns="90620" tIns="45310" rIns="90620" bIns="45310" rtlCol="0" anchor="b"/>
           <a:lstStyle>
             <a:lvl1pPr algn="l">
               <a:defRPr sz="1100"/>
@@ -257,15 +257,15 @@
         </p:nvSpPr>
         <p:spPr>
           <a:xfrm>
-            <a:off x="5796349" y="6746119"/>
-            <a:ext cx="4434311" cy="356357"/>
+            <a:off x="5593127" y="6456612"/>
+            <a:ext cx="4278842" cy="341064"/>
           </a:xfrm>
           <a:prstGeom prst="rect">
             <a:avLst/>
           </a:prstGeom>
         </p:spPr>
         <p:txBody>
-          <a:bodyPr vert="horz" lIns="94652" tIns="47326" rIns="94652" bIns="47326" rtlCol="0" anchor="b"/>
+          <a:bodyPr vert="horz" lIns="90620" tIns="45310" rIns="90620" bIns="45310" rtlCol="0" anchor="b"/>
           <a:lstStyle>
             <a:lvl1pPr algn="r">
               <a:defRPr sz="1100"/>
@@ -326,14 +326,14 @@
         <p:spPr>
           <a:xfrm>
             <a:off x="0" y="2"/>
-            <a:ext cx="4434311" cy="356359"/>
+            <a:ext cx="4278842" cy="341066"/>
           </a:xfrm>
           <a:prstGeom prst="rect">
             <a:avLst/>
           </a:prstGeom>
         </p:spPr>
         <p:txBody>
-          <a:bodyPr vert="horz" lIns="94652" tIns="47326" rIns="94652" bIns="47326" rtlCol="0"/>
+          <a:bodyPr vert="horz" lIns="90620" tIns="45310" rIns="90620" bIns="45310" rtlCol="0"/>
           <a:lstStyle>
             <a:lvl1pPr algn="l">
               <a:defRPr sz="1100"/>
@@ -356,15 +356,15 @@
         </p:nvSpPr>
         <p:spPr>
           <a:xfrm>
-            <a:off x="5796349" y="2"/>
-            <a:ext cx="4434311" cy="356359"/>
+            <a:off x="5593127" y="2"/>
+            <a:ext cx="4278842" cy="341066"/>
           </a:xfrm>
           <a:prstGeom prst="rect">
             <a:avLst/>
           </a:prstGeom>
         </p:spPr>
         <p:txBody>
-          <a:bodyPr vert="horz" lIns="94652" tIns="47326" rIns="94652" bIns="47326" rtlCol="0"/>
+          <a:bodyPr vert="horz" lIns="90620" tIns="45310" rIns="90620" bIns="45310" rtlCol="0"/>
           <a:lstStyle>
             <a:lvl1pPr algn="r">
               <a:defRPr sz="1100"/>
@@ -373,7 +373,7 @@
           <a:p>
             <a:fld id="{41B29D5C-5C04-480A-9659-9A97AE2F4290}" type="datetimeFigureOut">
               <a:rPr lang="en-US" smtClean="0"/>
-              <a:t>2/9/2017</a:t>
+              <a:t>2/10/2017</a:t>
             </a:fld>
             <a:endParaRPr lang="en-US"/>
           </a:p>
@@ -391,8 +391,8 @@
         </p:nvSpPr>
         <p:spPr>
           <a:xfrm>
-            <a:off x="2986088" y="887413"/>
-            <a:ext cx="4260850" cy="2397125"/>
+            <a:off x="2898775" y="849313"/>
+            <a:ext cx="4076700" cy="2293937"/>
           </a:xfrm>
           <a:prstGeom prst="rect">
             <a:avLst/>
@@ -405,7 +405,7 @@
           </a:ln>
         </p:spPr>
         <p:txBody>
-          <a:bodyPr vert="horz" lIns="94652" tIns="47326" rIns="94652" bIns="47326" rtlCol="0" anchor="ctr"/>
+          <a:bodyPr vert="horz" lIns="90620" tIns="45310" rIns="90620" bIns="45310" rtlCol="0" anchor="ctr"/>
           <a:lstStyle/>
           <a:p>
             <a:endParaRPr lang="en-US"/>
@@ -424,15 +424,15 @@
         </p:nvSpPr>
         <p:spPr>
           <a:xfrm>
-            <a:off x="1023304" y="3418069"/>
-            <a:ext cx="8186419" cy="2796600"/>
+            <a:off x="987427" y="3271384"/>
+            <a:ext cx="7899399" cy="2676585"/>
           </a:xfrm>
           <a:prstGeom prst="rect">
             <a:avLst/>
           </a:prstGeom>
         </p:spPr>
         <p:txBody>
-          <a:bodyPr vert="horz" lIns="94652" tIns="47326" rIns="94652" bIns="47326" rtlCol="0"/>
+          <a:bodyPr vert="horz" lIns="90620" tIns="45310" rIns="90620" bIns="45310" rtlCol="0"/>
           <a:lstStyle/>
           <a:p>
             <a:pPr lvl="0"/>
@@ -483,15 +483,15 @@
         </p:nvSpPr>
         <p:spPr>
           <a:xfrm>
-            <a:off x="0" y="6746119"/>
-            <a:ext cx="4434311" cy="356357"/>
+            <a:off x="0" y="6456612"/>
+            <a:ext cx="4278842" cy="341064"/>
           </a:xfrm>
           <a:prstGeom prst="rect">
             <a:avLst/>
           </a:prstGeom>
         </p:spPr>
         <p:txBody>
-          <a:bodyPr vert="horz" lIns="94652" tIns="47326" rIns="94652" bIns="47326" rtlCol="0" anchor="b"/>
+          <a:bodyPr vert="horz" lIns="90620" tIns="45310" rIns="90620" bIns="45310" rtlCol="0" anchor="b"/>
           <a:lstStyle>
             <a:lvl1pPr algn="l">
               <a:defRPr sz="1100"/>
@@ -514,15 +514,15 @@
         </p:nvSpPr>
         <p:spPr>
           <a:xfrm>
-            <a:off x="5796349" y="6746119"/>
-            <a:ext cx="4434311" cy="356357"/>
+            <a:off x="5593127" y="6456612"/>
+            <a:ext cx="4278842" cy="341064"/>
           </a:xfrm>
           <a:prstGeom prst="rect">
             <a:avLst/>
           </a:prstGeom>
         </p:spPr>
         <p:txBody>
-          <a:bodyPr vert="horz" lIns="94652" tIns="47326" rIns="94652" bIns="47326" rtlCol="0" anchor="b"/>
+          <a:bodyPr vert="horz" lIns="90620" tIns="45310" rIns="90620" bIns="45310" rtlCol="0" anchor="b"/>
           <a:lstStyle>
             <a:lvl1pPr algn="r">
               <a:defRPr sz="1100"/>
@@ -684,7 +684,7 @@
           <a:bodyPr/>
           <a:lstStyle/>
           <a:p>
-            <a:endParaRPr lang="en-US" dirty="0"/>
+            <a:endParaRPr lang="en-US"/>
           </a:p>
         </p:txBody>
       </p:sp>
@@ -705,7 +705,7 @@
           <a:p>
             <a:fld id="{616B0102-43C5-42A1-BC9D-A7087B77041F}" type="slidenum">
               <a:rPr lang="en-US" smtClean="0"/>
-              <a:t>2</a:t>
+              <a:t>1</a:t>
             </a:fld>
             <a:endParaRPr lang="en-US"/>
           </a:p>
@@ -714,7 +714,7 @@
     </p:spTree>
     <p:extLst>
       <p:ext uri="{BB962C8B-B14F-4D97-AF65-F5344CB8AC3E}">
-        <p14:creationId xmlns:p14="http://schemas.microsoft.com/office/powerpoint/2010/main" val="2868224789"/>
+        <p14:creationId xmlns:p14="http://schemas.microsoft.com/office/powerpoint/2010/main" val="4136654447"/>
       </p:ext>
     </p:extLst>
   </p:cSld>
@@ -789,7 +789,7 @@
           <a:p>
             <a:fld id="{616B0102-43C5-42A1-BC9D-A7087B77041F}" type="slidenum">
               <a:rPr lang="en-US" smtClean="0"/>
-              <a:t>3</a:t>
+              <a:t>2</a:t>
             </a:fld>
             <a:endParaRPr lang="en-US"/>
           </a:p>
@@ -798,7 +798,7 @@
     </p:spTree>
     <p:extLst>
       <p:ext uri="{BB962C8B-B14F-4D97-AF65-F5344CB8AC3E}">
-        <p14:creationId xmlns:p14="http://schemas.microsoft.com/office/powerpoint/2010/main" val="4060455353"/>
+        <p14:creationId xmlns:p14="http://schemas.microsoft.com/office/powerpoint/2010/main" val="2868224789"/>
       </p:ext>
     </p:extLst>
   </p:cSld>
@@ -852,6 +852,342 @@
           <a:bodyPr/>
           <a:lstStyle/>
           <a:p>
+            <a:endParaRPr lang="en-US" dirty="0"/>
+          </a:p>
+        </p:txBody>
+      </p:sp>
+      <p:sp>
+        <p:nvSpPr>
+          <p:cNvPr id="4" name="Slide Number Placeholder 3"/>
+          <p:cNvSpPr>
+            <a:spLocks noGrp="1"/>
+          </p:cNvSpPr>
+          <p:nvPr>
+            <p:ph type="sldNum" sz="quarter" idx="10"/>
+          </p:nvPr>
+        </p:nvSpPr>
+        <p:spPr/>
+        <p:txBody>
+          <a:bodyPr/>
+          <a:lstStyle/>
+          <a:p>
+            <a:fld id="{616B0102-43C5-42A1-BC9D-A7087B77041F}" type="slidenum">
+              <a:rPr lang="en-US" smtClean="0"/>
+              <a:t>3</a:t>
+            </a:fld>
+            <a:endParaRPr lang="en-US"/>
+          </a:p>
+        </p:txBody>
+      </p:sp>
+    </p:spTree>
+    <p:extLst>
+      <p:ext uri="{BB962C8B-B14F-4D97-AF65-F5344CB8AC3E}">
+        <p14:creationId xmlns:p14="http://schemas.microsoft.com/office/powerpoint/2010/main" val="4060455353"/>
+      </p:ext>
+    </p:extLst>
+  </p:cSld>
+  <p:clrMapOvr>
+    <a:masterClrMapping/>
+  </p:clrMapOvr>
+</p:notes>
+</file>
+
+<file path=ppt/notesSlides/notesSlide4.xml><?xml version="1.0" encoding="utf-8"?>
+<p:notes xmlns:a="http://schemas.openxmlformats.org/drawingml/2006/main" xmlns:r="http://schemas.openxmlformats.org/officeDocument/2006/relationships" xmlns:p="http://schemas.openxmlformats.org/presentationml/2006/main">
+  <p:cSld>
+    <p:spTree>
+      <p:nvGrpSpPr>
+        <p:cNvPr id="1" name=""/>
+        <p:cNvGrpSpPr/>
+        <p:nvPr/>
+      </p:nvGrpSpPr>
+      <p:grpSpPr>
+        <a:xfrm>
+          <a:off x="0" y="0"/>
+          <a:ext cx="0" cy="0"/>
+          <a:chOff x="0" y="0"/>
+          <a:chExt cx="0" cy="0"/>
+        </a:xfrm>
+      </p:grpSpPr>
+      <p:sp>
+        <p:nvSpPr>
+          <p:cNvPr id="2" name="Slide Image Placeholder 1"/>
+          <p:cNvSpPr>
+            <a:spLocks noGrp="1" noRot="1" noChangeAspect="1"/>
+          </p:cNvSpPr>
+          <p:nvPr>
+            <p:ph type="sldImg"/>
+          </p:nvPr>
+        </p:nvSpPr>
+        <p:spPr/>
+      </p:sp>
+      <p:sp>
+        <p:nvSpPr>
+          <p:cNvPr id="3" name="Notes Placeholder 2"/>
+          <p:cNvSpPr>
+            <a:spLocks noGrp="1"/>
+          </p:cNvSpPr>
+          <p:nvPr>
+            <p:ph type="body" idx="1"/>
+          </p:nvPr>
+        </p:nvSpPr>
+        <p:spPr/>
+        <p:txBody>
+          <a:bodyPr/>
+          <a:lstStyle/>
+          <a:p>
+            <a:endParaRPr lang="en-US"/>
+          </a:p>
+        </p:txBody>
+      </p:sp>
+      <p:sp>
+        <p:nvSpPr>
+          <p:cNvPr id="4" name="Slide Number Placeholder 3"/>
+          <p:cNvSpPr>
+            <a:spLocks noGrp="1"/>
+          </p:cNvSpPr>
+          <p:nvPr>
+            <p:ph type="sldNum" sz="quarter" idx="10"/>
+          </p:nvPr>
+        </p:nvSpPr>
+        <p:spPr/>
+        <p:txBody>
+          <a:bodyPr/>
+          <a:lstStyle/>
+          <a:p>
+            <a:fld id="{616B0102-43C5-42A1-BC9D-A7087B77041F}" type="slidenum">
+              <a:rPr lang="en-US" smtClean="0"/>
+              <a:t>4</a:t>
+            </a:fld>
+            <a:endParaRPr lang="en-US"/>
+          </a:p>
+        </p:txBody>
+      </p:sp>
+    </p:spTree>
+    <p:extLst>
+      <p:ext uri="{BB962C8B-B14F-4D97-AF65-F5344CB8AC3E}">
+        <p14:creationId xmlns:p14="http://schemas.microsoft.com/office/powerpoint/2010/main" val="3200003836"/>
+      </p:ext>
+    </p:extLst>
+  </p:cSld>
+  <p:clrMapOvr>
+    <a:masterClrMapping/>
+  </p:clrMapOvr>
+</p:notes>
+</file>
+
+<file path=ppt/notesSlides/notesSlide5.xml><?xml version="1.0" encoding="utf-8"?>
+<p:notes xmlns:a="http://schemas.openxmlformats.org/drawingml/2006/main" xmlns:r="http://schemas.openxmlformats.org/officeDocument/2006/relationships" xmlns:p="http://schemas.openxmlformats.org/presentationml/2006/main">
+  <p:cSld>
+    <p:spTree>
+      <p:nvGrpSpPr>
+        <p:cNvPr id="1" name=""/>
+        <p:cNvGrpSpPr/>
+        <p:nvPr/>
+      </p:nvGrpSpPr>
+      <p:grpSpPr>
+        <a:xfrm>
+          <a:off x="0" y="0"/>
+          <a:ext cx="0" cy="0"/>
+          <a:chOff x="0" y="0"/>
+          <a:chExt cx="0" cy="0"/>
+        </a:xfrm>
+      </p:grpSpPr>
+      <p:sp>
+        <p:nvSpPr>
+          <p:cNvPr id="2" name="Slide Image Placeholder 1"/>
+          <p:cNvSpPr>
+            <a:spLocks noGrp="1" noRot="1" noChangeAspect="1"/>
+          </p:cNvSpPr>
+          <p:nvPr>
+            <p:ph type="sldImg"/>
+          </p:nvPr>
+        </p:nvSpPr>
+        <p:spPr/>
+      </p:sp>
+      <p:sp>
+        <p:nvSpPr>
+          <p:cNvPr id="3" name="Notes Placeholder 2"/>
+          <p:cNvSpPr>
+            <a:spLocks noGrp="1"/>
+          </p:cNvSpPr>
+          <p:nvPr>
+            <p:ph type="body" idx="1"/>
+          </p:nvPr>
+        </p:nvSpPr>
+        <p:spPr/>
+        <p:txBody>
+          <a:bodyPr/>
+          <a:lstStyle/>
+          <a:p>
+            <a:endParaRPr lang="en-US"/>
+          </a:p>
+        </p:txBody>
+      </p:sp>
+      <p:sp>
+        <p:nvSpPr>
+          <p:cNvPr id="4" name="Slide Number Placeholder 3"/>
+          <p:cNvSpPr>
+            <a:spLocks noGrp="1"/>
+          </p:cNvSpPr>
+          <p:nvPr>
+            <p:ph type="sldNum" sz="quarter" idx="10"/>
+          </p:nvPr>
+        </p:nvSpPr>
+        <p:spPr/>
+        <p:txBody>
+          <a:bodyPr/>
+          <a:lstStyle/>
+          <a:p>
+            <a:fld id="{616B0102-43C5-42A1-BC9D-A7087B77041F}" type="slidenum">
+              <a:rPr lang="en-US" smtClean="0"/>
+              <a:t>5</a:t>
+            </a:fld>
+            <a:endParaRPr lang="en-US"/>
+          </a:p>
+        </p:txBody>
+      </p:sp>
+    </p:spTree>
+    <p:extLst>
+      <p:ext uri="{BB962C8B-B14F-4D97-AF65-F5344CB8AC3E}">
+        <p14:creationId xmlns:p14="http://schemas.microsoft.com/office/powerpoint/2010/main" val="259133903"/>
+      </p:ext>
+    </p:extLst>
+  </p:cSld>
+  <p:clrMapOvr>
+    <a:masterClrMapping/>
+  </p:clrMapOvr>
+</p:notes>
+</file>
+
+<file path=ppt/notesSlides/notesSlide6.xml><?xml version="1.0" encoding="utf-8"?>
+<p:notes xmlns:a="http://schemas.openxmlformats.org/drawingml/2006/main" xmlns:r="http://schemas.openxmlformats.org/officeDocument/2006/relationships" xmlns:p="http://schemas.openxmlformats.org/presentationml/2006/main">
+  <p:cSld>
+    <p:spTree>
+      <p:nvGrpSpPr>
+        <p:cNvPr id="1" name=""/>
+        <p:cNvGrpSpPr/>
+        <p:nvPr/>
+      </p:nvGrpSpPr>
+      <p:grpSpPr>
+        <a:xfrm>
+          <a:off x="0" y="0"/>
+          <a:ext cx="0" cy="0"/>
+          <a:chOff x="0" y="0"/>
+          <a:chExt cx="0" cy="0"/>
+        </a:xfrm>
+      </p:grpSpPr>
+      <p:sp>
+        <p:nvSpPr>
+          <p:cNvPr id="2" name="Slide Image Placeholder 1"/>
+          <p:cNvSpPr>
+            <a:spLocks noGrp="1" noRot="1" noChangeAspect="1"/>
+          </p:cNvSpPr>
+          <p:nvPr>
+            <p:ph type="sldImg"/>
+          </p:nvPr>
+        </p:nvSpPr>
+        <p:spPr/>
+      </p:sp>
+      <p:sp>
+        <p:nvSpPr>
+          <p:cNvPr id="3" name="Notes Placeholder 2"/>
+          <p:cNvSpPr>
+            <a:spLocks noGrp="1"/>
+          </p:cNvSpPr>
+          <p:nvPr>
+            <p:ph type="body" idx="1"/>
+          </p:nvPr>
+        </p:nvSpPr>
+        <p:spPr/>
+        <p:txBody>
+          <a:bodyPr/>
+          <a:lstStyle/>
+          <a:p>
+            <a:endParaRPr lang="en-US"/>
+          </a:p>
+        </p:txBody>
+      </p:sp>
+      <p:sp>
+        <p:nvSpPr>
+          <p:cNvPr id="4" name="Slide Number Placeholder 3"/>
+          <p:cNvSpPr>
+            <a:spLocks noGrp="1"/>
+          </p:cNvSpPr>
+          <p:nvPr>
+            <p:ph type="sldNum" sz="quarter" idx="10"/>
+          </p:nvPr>
+        </p:nvSpPr>
+        <p:spPr/>
+        <p:txBody>
+          <a:bodyPr/>
+          <a:lstStyle/>
+          <a:p>
+            <a:fld id="{616B0102-43C5-42A1-BC9D-A7087B77041F}" type="slidenum">
+              <a:rPr lang="en-US" smtClean="0"/>
+              <a:t>6</a:t>
+            </a:fld>
+            <a:endParaRPr lang="en-US"/>
+          </a:p>
+        </p:txBody>
+      </p:sp>
+    </p:spTree>
+    <p:extLst>
+      <p:ext uri="{BB962C8B-B14F-4D97-AF65-F5344CB8AC3E}">
+        <p14:creationId xmlns:p14="http://schemas.microsoft.com/office/powerpoint/2010/main" val="819860439"/>
+      </p:ext>
+    </p:extLst>
+  </p:cSld>
+  <p:clrMapOvr>
+    <a:masterClrMapping/>
+  </p:clrMapOvr>
+</p:notes>
+</file>
+
+<file path=ppt/notesSlides/notesSlide7.xml><?xml version="1.0" encoding="utf-8"?>
+<p:notes xmlns:a="http://schemas.openxmlformats.org/drawingml/2006/main" xmlns:r="http://schemas.openxmlformats.org/officeDocument/2006/relationships" xmlns:p="http://schemas.openxmlformats.org/presentationml/2006/main">
+  <p:cSld>
+    <p:spTree>
+      <p:nvGrpSpPr>
+        <p:cNvPr id="1" name=""/>
+        <p:cNvGrpSpPr/>
+        <p:nvPr/>
+      </p:nvGrpSpPr>
+      <p:grpSpPr>
+        <a:xfrm>
+          <a:off x="0" y="0"/>
+          <a:ext cx="0" cy="0"/>
+          <a:chOff x="0" y="0"/>
+          <a:chExt cx="0" cy="0"/>
+        </a:xfrm>
+      </p:grpSpPr>
+      <p:sp>
+        <p:nvSpPr>
+          <p:cNvPr id="2" name="Slide Image Placeholder 1"/>
+          <p:cNvSpPr>
+            <a:spLocks noGrp="1" noRot="1" noChangeAspect="1"/>
+          </p:cNvSpPr>
+          <p:nvPr>
+            <p:ph type="sldImg"/>
+          </p:nvPr>
+        </p:nvSpPr>
+        <p:spPr/>
+      </p:sp>
+      <p:sp>
+        <p:nvSpPr>
+          <p:cNvPr id="3" name="Notes Placeholder 2"/>
+          <p:cNvSpPr>
+            <a:spLocks noGrp="1"/>
+          </p:cNvSpPr>
+          <p:nvPr>
+            <p:ph type="body" idx="1"/>
+          </p:nvPr>
+        </p:nvSpPr>
+        <p:spPr/>
+        <p:txBody>
+          <a:bodyPr/>
+          <a:lstStyle/>
+          <a:p>
             <a:r>
               <a:rPr lang="en-US" dirty="0"/>
               <a:t>It is only the outcome, not the state that is visible to an external observer and therefore states are ``hidden'' to the outside; hence the name Hidden Markov Model is a perfect solution for addressing detection.</a:t>
@@ -892,6 +1228,90 @@
     <p:extLst>
       <p:ext uri="{BB962C8B-B14F-4D97-AF65-F5344CB8AC3E}">
         <p14:creationId xmlns:p14="http://schemas.microsoft.com/office/powerpoint/2010/main" val="784927014"/>
+      </p:ext>
+    </p:extLst>
+  </p:cSld>
+  <p:clrMapOvr>
+    <a:masterClrMapping/>
+  </p:clrMapOvr>
+</p:notes>
+</file>
+
+<file path=ppt/notesSlides/notesSlide8.xml><?xml version="1.0" encoding="utf-8"?>
+<p:notes xmlns:a="http://schemas.openxmlformats.org/drawingml/2006/main" xmlns:r="http://schemas.openxmlformats.org/officeDocument/2006/relationships" xmlns:p="http://schemas.openxmlformats.org/presentationml/2006/main">
+  <p:cSld>
+    <p:spTree>
+      <p:nvGrpSpPr>
+        <p:cNvPr id="1" name=""/>
+        <p:cNvGrpSpPr/>
+        <p:nvPr/>
+      </p:nvGrpSpPr>
+      <p:grpSpPr>
+        <a:xfrm>
+          <a:off x="0" y="0"/>
+          <a:ext cx="0" cy="0"/>
+          <a:chOff x="0" y="0"/>
+          <a:chExt cx="0" cy="0"/>
+        </a:xfrm>
+      </p:grpSpPr>
+      <p:sp>
+        <p:nvSpPr>
+          <p:cNvPr id="2" name="Slide Image Placeholder 1"/>
+          <p:cNvSpPr>
+            <a:spLocks noGrp="1" noRot="1" noChangeAspect="1"/>
+          </p:cNvSpPr>
+          <p:nvPr>
+            <p:ph type="sldImg"/>
+          </p:nvPr>
+        </p:nvSpPr>
+        <p:spPr/>
+      </p:sp>
+      <p:sp>
+        <p:nvSpPr>
+          <p:cNvPr id="3" name="Notes Placeholder 2"/>
+          <p:cNvSpPr>
+            <a:spLocks noGrp="1"/>
+          </p:cNvSpPr>
+          <p:nvPr>
+            <p:ph type="body" idx="1"/>
+          </p:nvPr>
+        </p:nvSpPr>
+        <p:spPr/>
+        <p:txBody>
+          <a:bodyPr/>
+          <a:lstStyle/>
+          <a:p>
+            <a:endParaRPr lang="en-US"/>
+          </a:p>
+        </p:txBody>
+      </p:sp>
+      <p:sp>
+        <p:nvSpPr>
+          <p:cNvPr id="4" name="Slide Number Placeholder 3"/>
+          <p:cNvSpPr>
+            <a:spLocks noGrp="1"/>
+          </p:cNvSpPr>
+          <p:nvPr>
+            <p:ph type="sldNum" sz="quarter" idx="10"/>
+          </p:nvPr>
+        </p:nvSpPr>
+        <p:spPr/>
+        <p:txBody>
+          <a:bodyPr/>
+          <a:lstStyle/>
+          <a:p>
+            <a:fld id="{616B0102-43C5-42A1-BC9D-A7087B77041F}" type="slidenum">
+              <a:rPr lang="en-US" smtClean="0"/>
+              <a:t>8</a:t>
+            </a:fld>
+            <a:endParaRPr lang="en-US"/>
+          </a:p>
+        </p:txBody>
+      </p:sp>
+    </p:spTree>
+    <p:extLst>
+      <p:ext uri="{BB962C8B-B14F-4D97-AF65-F5344CB8AC3E}">
+        <p14:creationId xmlns:p14="http://schemas.microsoft.com/office/powerpoint/2010/main" val="3133556114"/>
       </p:ext>
     </p:extLst>
   </p:cSld>
@@ -1147,7 +1567,7 @@
             <a:fld id="{B61BEF0D-F0BB-DE4B-95CE-6DB70DBA9567}" type="datetimeFigureOut">
               <a:rPr lang="en-US" smtClean="0"/>
               <a:pPr/>
-              <a:t>2/9/2017</a:t>
+              <a:t>2/10/2017</a:t>
             </a:fld>
             <a:endParaRPr lang="en-US" dirty="0"/>
           </a:p>
@@ -1411,7 +1831,7 @@
             <a:fld id="{B61BEF0D-F0BB-DE4B-95CE-6DB70DBA9567}" type="datetimeFigureOut">
               <a:rPr lang="en-US" smtClean="0"/>
               <a:pPr/>
-              <a:t>2/9/2017</a:t>
+              <a:t>2/10/2017</a:t>
             </a:fld>
             <a:endParaRPr lang="en-US" dirty="0"/>
           </a:p>
@@ -1648,7 +2068,7 @@
             <a:fld id="{B61BEF0D-F0BB-DE4B-95CE-6DB70DBA9567}" type="datetimeFigureOut">
               <a:rPr lang="en-US" smtClean="0"/>
               <a:pPr/>
-              <a:t>2/9/2017</a:t>
+              <a:t>2/10/2017</a:t>
             </a:fld>
             <a:endParaRPr lang="en-US" dirty="0"/>
           </a:p>
@@ -1890,7 +2310,7 @@
             <a:fld id="{B61BEF0D-F0BB-DE4B-95CE-6DB70DBA9567}" type="datetimeFigureOut">
               <a:rPr lang="en-US" smtClean="0"/>
               <a:pPr/>
-              <a:t>2/9/2017</a:t>
+              <a:t>2/10/2017</a:t>
             </a:fld>
             <a:endParaRPr lang="en-US" dirty="0"/>
           </a:p>
@@ -2199,7 +2619,7 @@
             <a:fld id="{B61BEF0D-F0BB-DE4B-95CE-6DB70DBA9567}" type="datetimeFigureOut">
               <a:rPr lang="en-US" smtClean="0"/>
               <a:pPr/>
-              <a:t>2/9/2017</a:t>
+              <a:t>2/10/2017</a:t>
             </a:fld>
             <a:endParaRPr lang="en-US" dirty="0"/>
           </a:p>
@@ -2503,7 +2923,7 @@
             <a:fld id="{B61BEF0D-F0BB-DE4B-95CE-6DB70DBA9567}" type="datetimeFigureOut">
               <a:rPr lang="en-US" smtClean="0"/>
               <a:pPr/>
-              <a:t>2/9/2017</a:t>
+              <a:t>2/10/2017</a:t>
             </a:fld>
             <a:endParaRPr lang="en-US" dirty="0"/>
           </a:p>
@@ -2927,7 +3347,7 @@
             <a:fld id="{B61BEF0D-F0BB-DE4B-95CE-6DB70DBA9567}" type="datetimeFigureOut">
               <a:rPr lang="en-US" smtClean="0"/>
               <a:pPr/>
-              <a:t>2/9/2017</a:t>
+              <a:t>2/10/2017</a:t>
             </a:fld>
             <a:endParaRPr lang="en-US" dirty="0"/>
           </a:p>
@@ -3024,7 +3444,7 @@
             <a:fld id="{B61BEF0D-F0BB-DE4B-95CE-6DB70DBA9567}" type="datetimeFigureOut">
               <a:rPr lang="en-US" smtClean="0"/>
               <a:pPr/>
-              <a:t>2/9/2017</a:t>
+              <a:t>2/10/2017</a:t>
             </a:fld>
             <a:endParaRPr lang="en-US" dirty="0"/>
           </a:p>
@@ -3188,7 +3608,7 @@
             <a:fld id="{B61BEF0D-F0BB-DE4B-95CE-6DB70DBA9567}" type="datetimeFigureOut">
               <a:rPr lang="en-US" smtClean="0"/>
               <a:pPr/>
-              <a:t>2/9/2017</a:t>
+              <a:t>2/10/2017</a:t>
             </a:fld>
             <a:endParaRPr lang="en-US" dirty="0"/>
           </a:p>
@@ -3568,7 +3988,7 @@
             <a:fld id="{B61BEF0D-F0BB-DE4B-95CE-6DB70DBA9567}" type="datetimeFigureOut">
               <a:rPr lang="en-US" smtClean="0"/>
               <a:pPr/>
-              <a:t>2/9/2017</a:t>
+              <a:t>2/10/2017</a:t>
             </a:fld>
             <a:endParaRPr lang="en-US" dirty="0"/>
           </a:p>
@@ -3859,7 +4279,7 @@
             <a:fld id="{B61BEF0D-F0BB-DE4B-95CE-6DB70DBA9567}" type="datetimeFigureOut">
               <a:rPr lang="en-US" smtClean="0"/>
               <a:pPr/>
-              <a:t>2/9/2017</a:t>
+              <a:t>2/10/2017</a:t>
             </a:fld>
             <a:endParaRPr lang="en-US" dirty="0"/>
           </a:p>
@@ -4072,7 +4492,7 @@
             <a:fld id="{B61BEF0D-F0BB-DE4B-95CE-6DB70DBA9567}" type="datetimeFigureOut">
               <a:rPr lang="en-US" smtClean="0"/>
               <a:pPr/>
-              <a:t>2/9/2017</a:t>
+              <a:t>2/10/2017</a:t>
             </a:fld>
             <a:endParaRPr lang="en-US" dirty="0"/>
           </a:p>
@@ -6556,8 +6976,8 @@
           </a:p>
         </p:txBody>
       </p:sp>
-      <mc:AlternateContent xmlns:mc="http://schemas.openxmlformats.org/markup-compatibility/2006">
-        <mc:Choice xmlns:a14="http://schemas.microsoft.com/office/drawing/2010/main" Requires="a14">
+      <mc:AlternateContent xmlns:mc="http://schemas.openxmlformats.org/markup-compatibility/2006" xmlns:a14="http://schemas.microsoft.com/office/drawing/2010/main">
+        <mc:Choice Requires="a14">
           <p:sp>
             <p:nvSpPr>
               <p:cNvPr id="31" name="Content Placeholder 2"/>
@@ -6945,7 +7365,7 @@
             </p:txBody>
           </p:sp>
         </mc:Choice>
-        <mc:Fallback>
+        <mc:Fallback xmlns="">
           <p:sp>
             <p:nvSpPr>
               <p:cNvPr id="31" name="Content Placeholder 2"/>
@@ -8487,7 +8907,7 @@
           <a:p>
             <a:r>
               <a:rPr lang="en-US" sz="2400" dirty="0"/>
-              <a:t>Find suitable method to detect the change in CPU Utilization</a:t>
+              <a:t>Find suitable method to detect the changes in CPU Utilization</a:t>
             </a:r>
           </a:p>
           <a:p>
@@ -8574,65 +8994,67 @@
         </p:nvSpPr>
         <p:spPr/>
         <p:txBody>
-          <a:bodyPr anchor="t"/>
+          <a:bodyPr anchor="t">
+            <a:normAutofit/>
+          </a:bodyPr>
           <a:lstStyle/>
           <a:p>
             <a:r>
-              <a:rPr lang="en-US" dirty="0"/>
+              <a:rPr lang="en-US" sz="2000" dirty="0"/>
               <a:t>James, N. A., &amp; Matteson, D. S. (2013). </a:t>
             </a:r>
             <a:r>
-              <a:rPr lang="en-US" dirty="0" err="1"/>
+              <a:rPr lang="en-US" sz="2000" dirty="0" err="1"/>
               <a:t>ecp</a:t>
             </a:r>
             <a:r>
-              <a:rPr lang="en-US" dirty="0"/>
+              <a:rPr lang="en-US" sz="2000" dirty="0"/>
               <a:t>: An R package for nonparametric multiple change point analysis of multivariate data. </a:t>
             </a:r>
             <a:r>
-              <a:rPr lang="en-US" i="1" dirty="0" err="1"/>
+              <a:rPr lang="en-US" sz="2000" i="1" dirty="0" err="1"/>
               <a:t>arXiv</a:t>
             </a:r>
             <a:r>
-              <a:rPr lang="en-US" i="1" dirty="0"/>
+              <a:rPr lang="en-US" sz="2000" i="1" dirty="0"/>
               <a:t> preprint arXiv:1309.3295</a:t>
             </a:r>
             <a:r>
-              <a:rPr lang="en-US" dirty="0"/>
+              <a:rPr lang="en-US" sz="2000" dirty="0"/>
               <a:t>.</a:t>
             </a:r>
           </a:p>
           <a:p>
             <a:r>
-              <a:rPr lang="en-US" dirty="0"/>
+              <a:rPr lang="en-US" sz="2000" dirty="0"/>
               <a:t>Luong, T. M., </a:t>
             </a:r>
             <a:r>
-              <a:rPr lang="en-US" dirty="0" err="1"/>
+              <a:rPr lang="en-US" sz="2000" dirty="0" err="1"/>
               <a:t>Perduca</a:t>
             </a:r>
             <a:r>
-              <a:rPr lang="en-US" dirty="0"/>
+              <a:rPr lang="en-US" sz="2000" dirty="0"/>
               <a:t>, V., &amp; </a:t>
             </a:r>
             <a:r>
-              <a:rPr lang="en-US" dirty="0" err="1"/>
+              <a:rPr lang="en-US" sz="2000" dirty="0" err="1"/>
               <a:t>Nuel</a:t>
             </a:r>
             <a:r>
-              <a:rPr lang="en-US" dirty="0"/>
+              <a:rPr lang="en-US" sz="2000" dirty="0"/>
               <a:t>, G. (2012). Hidden Markov Model Applications in Change-Point Analysis. </a:t>
             </a:r>
             <a:r>
-              <a:rPr lang="en-US" i="1" dirty="0" err="1"/>
+              <a:rPr lang="en-US" sz="2000" i="1" dirty="0" err="1"/>
               <a:t>arXiv</a:t>
             </a:r>
             <a:r>
-              <a:rPr lang="en-US" i="1" dirty="0"/>
+              <a:rPr lang="en-US" sz="2000" i="1" dirty="0"/>
               <a:t> preprint arXiv:1212.1778</a:t>
             </a:r>
             <a:r>
-              <a:rPr lang="en-US" dirty="0"/>
+              <a:rPr lang="en-US" sz="2000" dirty="0"/>
               <a:t>.</a:t>
             </a:r>
           </a:p>

</xml_diff>